<commit_message>
individual user registration detail
</commit_message>
<xml_diff>
--- a/Docs/presentation/ENET_FT1_presentation_sketch.pptx
+++ b/Docs/presentation/ENET_FT1_presentation_sketch.pptx
@@ -14,8 +14,8 @@
     <p:sldId id="259" r:id="rId5"/>
     <p:sldId id="260" r:id="rId6"/>
     <p:sldId id="262" r:id="rId7"/>
-    <p:sldId id="263" r:id="rId8"/>
-    <p:sldId id="264" r:id="rId9"/>
+    <p:sldId id="264" r:id="rId8"/>
+    <p:sldId id="263" r:id="rId9"/>
   </p:sldIdLst>
   <p:sldSz cx="9144000" cy="6858000" type="screen4x3"/>
   <p:notesSz cx="6858000" cy="9144000"/>
@@ -114,6 +114,22 @@
       </a:defRPr>
     </a:lvl9pPr>
   </p:defaultTextStyle>
+  <p:extLst>
+    <p:ext uri="{EFAFB233-063F-42B5-8137-9DF3F51BA10A}">
+      <p15:sldGuideLst xmlns:p15="http://schemas.microsoft.com/office/powerpoint/2012/main">
+        <p15:guide id="1" orient="horz" pos="2160">
+          <p15:clr>
+            <a:srgbClr val="A4A3A4"/>
+          </p15:clr>
+        </p15:guide>
+        <p15:guide id="2" pos="2880">
+          <p15:clr>
+            <a:srgbClr val="A4A3A4"/>
+          </p15:clr>
+        </p15:guide>
+      </p15:sldGuideLst>
+    </p:ext>
+  </p:extLst>
 </p:presentation>
 </file>
 
@@ -199,7 +215,7 @@
           <a:p>
             <a:fld id="{688D4497-BD68-4C84-AD45-B2C2CF68FF77}" type="datetimeFigureOut">
               <a:rPr lang="zh-CN" altLang="en-US" smtClean="0"/>
-              <a:t>2015/6/21</a:t>
+              <a:t>2015/6/22</a:t>
             </a:fld>
             <a:endParaRPr lang="zh-CN" altLang="en-US"/>
           </a:p>
@@ -367,6 +383,11 @@
         </p:txBody>
       </p:sp>
     </p:spTree>
+    <p:extLst>
+      <p:ext uri="{BB962C8B-B14F-4D97-AF65-F5344CB8AC3E}">
+        <p14:creationId xmlns:p14="http://schemas.microsoft.com/office/powerpoint/2010/main" val="72100738"/>
+      </p:ext>
+    </p:extLst>
   </p:cSld>
   <p:clrMap bg1="lt1" tx1="dk1" bg2="lt2" tx2="dk2" accent1="accent1" accent2="accent2" accent3="accent3" accent4="accent4" accent5="accent5" accent6="accent6" hlink="hlink" folHlink="folHlink"/>
   <p:notesStyle>
@@ -707,6 +728,11 @@
         </p:txBody>
       </p:sp>
     </p:spTree>
+    <p:extLst>
+      <p:ext uri="{BB962C8B-B14F-4D97-AF65-F5344CB8AC3E}">
+        <p14:creationId xmlns:p14="http://schemas.microsoft.com/office/powerpoint/2010/main" val="1053314717"/>
+      </p:ext>
+    </p:extLst>
   </p:cSld>
   <p:clrMapOvr>
     <a:masterClrMapping/>
@@ -763,7 +789,29 @@
             <a:pPr lvl="1"/>
             <a:r>
               <a:rPr lang="en-US" altLang="zh-CN" dirty="0" smtClean="0"/>
-              <a:t>PRL: collect data from request, </a:t>
+              <a:t>Model: base model</a:t>
+            </a:r>
+          </a:p>
+          <a:p>
+            <a:pPr lvl="1"/>
+            <a:r>
+              <a:rPr lang="en-US" altLang="zh-CN" dirty="0" smtClean="0"/>
+              <a:t>DAL: </a:t>
+            </a:r>
+          </a:p>
+          <a:p>
+            <a:pPr lvl="1"/>
+            <a:endParaRPr lang="en-US" altLang="zh-CN" dirty="0" smtClean="0"/>
+          </a:p>
+          <a:p>
+            <a:pPr lvl="1"/>
+            <a:r>
+              <a:rPr lang="en-US" altLang="zh-CN" dirty="0" smtClean="0"/>
+              <a:t>PRL</a:t>
+            </a:r>
+            <a:r>
+              <a:rPr lang="en-US" altLang="zh-CN" dirty="0" smtClean="0"/>
+              <a:t>: collect data from request, </a:t>
             </a:r>
           </a:p>
           <a:p>
@@ -800,14 +848,6 @@
           </a:p>
           <a:p>
             <a:pPr lvl="1"/>
-            <a:r>
-              <a:rPr lang="en-US" altLang="zh-CN" dirty="0" smtClean="0"/>
-              <a:t>DAL: data </a:t>
-            </a:r>
-            <a:r>
-              <a:rPr lang="en-US" altLang="zh-CN" dirty="0" err="1" smtClean="0"/>
-              <a:t>persistance</a:t>
-            </a:r>
             <a:endParaRPr lang="zh-CN" altLang="en-US" dirty="0"/>
           </a:p>
         </p:txBody>
@@ -836,6 +876,11 @@
         </p:txBody>
       </p:sp>
     </p:spTree>
+    <p:extLst>
+      <p:ext uri="{BB962C8B-B14F-4D97-AF65-F5344CB8AC3E}">
+        <p14:creationId xmlns:p14="http://schemas.microsoft.com/office/powerpoint/2010/main" val="2312808557"/>
+      </p:ext>
+    </p:extLst>
   </p:cSld>
   <p:clrMapOvr>
     <a:masterClrMapping/>
@@ -1025,7 +1070,7 @@
             <a:fld id="{530820CF-B880-4189-942D-D702A7CBA730}" type="datetimeFigureOut">
               <a:rPr lang="zh-CN" altLang="en-US" smtClean="0"/>
               <a:pPr/>
-              <a:t>2015/6/21</a:t>
+              <a:t>2015/6/22</a:t>
             </a:fld>
             <a:endParaRPr lang="zh-CN" altLang="en-US"/>
           </a:p>
@@ -1192,7 +1237,7 @@
             <a:fld id="{530820CF-B880-4189-942D-D702A7CBA730}" type="datetimeFigureOut">
               <a:rPr lang="zh-CN" altLang="en-US" smtClean="0"/>
               <a:pPr/>
-              <a:t>2015/6/21</a:t>
+              <a:t>2015/6/22</a:t>
             </a:fld>
             <a:endParaRPr lang="zh-CN" altLang="en-US"/>
           </a:p>
@@ -1369,7 +1414,7 @@
             <a:fld id="{530820CF-B880-4189-942D-D702A7CBA730}" type="datetimeFigureOut">
               <a:rPr lang="zh-CN" altLang="en-US" smtClean="0"/>
               <a:pPr/>
-              <a:t>2015/6/21</a:t>
+              <a:t>2015/6/22</a:t>
             </a:fld>
             <a:endParaRPr lang="zh-CN" altLang="en-US"/>
           </a:p>
@@ -1536,7 +1581,7 @@
             <a:fld id="{530820CF-B880-4189-942D-D702A7CBA730}" type="datetimeFigureOut">
               <a:rPr lang="zh-CN" altLang="en-US" smtClean="0"/>
               <a:pPr/>
-              <a:t>2015/6/21</a:t>
+              <a:t>2015/6/22</a:t>
             </a:fld>
             <a:endParaRPr lang="zh-CN" altLang="en-US"/>
           </a:p>
@@ -1779,7 +1824,7 @@
             <a:fld id="{530820CF-B880-4189-942D-D702A7CBA730}" type="datetimeFigureOut">
               <a:rPr lang="zh-CN" altLang="en-US" smtClean="0"/>
               <a:pPr/>
-              <a:t>2015/6/21</a:t>
+              <a:t>2015/6/22</a:t>
             </a:fld>
             <a:endParaRPr lang="zh-CN" altLang="en-US"/>
           </a:p>
@@ -2064,7 +2109,7 @@
             <a:fld id="{530820CF-B880-4189-942D-D702A7CBA730}" type="datetimeFigureOut">
               <a:rPr lang="zh-CN" altLang="en-US" smtClean="0"/>
               <a:pPr/>
-              <a:t>2015/6/21</a:t>
+              <a:t>2015/6/22</a:t>
             </a:fld>
             <a:endParaRPr lang="zh-CN" altLang="en-US"/>
           </a:p>
@@ -2483,7 +2528,7 @@
             <a:fld id="{530820CF-B880-4189-942D-D702A7CBA730}" type="datetimeFigureOut">
               <a:rPr lang="zh-CN" altLang="en-US" smtClean="0"/>
               <a:pPr/>
-              <a:t>2015/6/21</a:t>
+              <a:t>2015/6/22</a:t>
             </a:fld>
             <a:endParaRPr lang="zh-CN" altLang="en-US"/>
           </a:p>
@@ -2598,7 +2643,7 @@
             <a:fld id="{530820CF-B880-4189-942D-D702A7CBA730}" type="datetimeFigureOut">
               <a:rPr lang="zh-CN" altLang="en-US" smtClean="0"/>
               <a:pPr/>
-              <a:t>2015/6/21</a:t>
+              <a:t>2015/6/22</a:t>
             </a:fld>
             <a:endParaRPr lang="zh-CN" altLang="en-US"/>
           </a:p>
@@ -2690,7 +2735,7 @@
             <a:fld id="{530820CF-B880-4189-942D-D702A7CBA730}" type="datetimeFigureOut">
               <a:rPr lang="zh-CN" altLang="en-US" smtClean="0"/>
               <a:pPr/>
-              <a:t>2015/6/21</a:t>
+              <a:t>2015/6/22</a:t>
             </a:fld>
             <a:endParaRPr lang="zh-CN" altLang="en-US"/>
           </a:p>
@@ -2964,7 +3009,7 @@
             <a:fld id="{530820CF-B880-4189-942D-D702A7CBA730}" type="datetimeFigureOut">
               <a:rPr lang="zh-CN" altLang="en-US" smtClean="0"/>
               <a:pPr/>
-              <a:t>2015/6/21</a:t>
+              <a:t>2015/6/22</a:t>
             </a:fld>
             <a:endParaRPr lang="zh-CN" altLang="en-US"/>
           </a:p>
@@ -3214,7 +3259,7 @@
             <a:fld id="{530820CF-B880-4189-942D-D702A7CBA730}" type="datetimeFigureOut">
               <a:rPr lang="zh-CN" altLang="en-US" smtClean="0"/>
               <a:pPr/>
-              <a:t>2015/6/21</a:t>
+              <a:t>2015/6/22</a:t>
             </a:fld>
             <a:endParaRPr lang="zh-CN" altLang="en-US"/>
           </a:p>
@@ -3424,7 +3469,7 @@
             <a:fld id="{530820CF-B880-4189-942D-D702A7CBA730}" type="datetimeFigureOut">
               <a:rPr lang="zh-CN" altLang="en-US" smtClean="0"/>
               <a:pPr/>
-              <a:t>2015/6/21</a:t>
+              <a:t>2015/6/22</a:t>
             </a:fld>
             <a:endParaRPr lang="zh-CN" altLang="en-US"/>
           </a:p>
@@ -3849,9 +3894,9 @@
           <a:bodyPr/>
           <a:lstStyle/>
           <a:p>
-            <a:pPr algn="l">
-              <a:buFont typeface="Arial" pitchFamily="34" charset="0"/>
-              <a:buChar char="•"/>
+            <a:pPr marL="457200" indent="-457200" algn="l">
+              <a:buFont typeface="Wingdings" panose="05000000000000000000" pitchFamily="2" charset="2"/>
+              <a:buChar char="Ø"/>
             </a:pPr>
             <a:r>
               <a:rPr lang="en-US" altLang="zh-CN" dirty="0" smtClean="0">
@@ -3865,9 +3910,9 @@
             </a:r>
           </a:p>
           <a:p>
-            <a:pPr algn="l">
-              <a:buFont typeface="Arial" pitchFamily="34" charset="0"/>
-              <a:buChar char="•"/>
+            <a:pPr marL="457200" indent="-457200" algn="l">
+              <a:buFont typeface="Wingdings" panose="05000000000000000000" pitchFamily="2" charset="2"/>
+              <a:buChar char="Ø"/>
             </a:pPr>
             <a:r>
               <a:rPr lang="en-US" altLang="zh-CN" dirty="0" smtClean="0">
@@ -3881,9 +3926,9 @@
             </a:r>
           </a:p>
           <a:p>
-            <a:pPr algn="l">
-              <a:buFont typeface="Arial" pitchFamily="34" charset="0"/>
-              <a:buChar char="•"/>
+            <a:pPr marL="457200" indent="-457200" algn="l">
+              <a:buFont typeface="Wingdings" panose="05000000000000000000" pitchFamily="2" charset="2"/>
+              <a:buChar char="Ø"/>
             </a:pPr>
             <a:r>
               <a:rPr lang="en-US" altLang="zh-CN" dirty="0" smtClean="0">
@@ -3897,9 +3942,9 @@
             </a:r>
           </a:p>
           <a:p>
-            <a:pPr algn="l">
-              <a:buFont typeface="Arial" pitchFamily="34" charset="0"/>
-              <a:buChar char="•"/>
+            <a:pPr marL="457200" indent="-457200" algn="l">
+              <a:buFont typeface="Wingdings" panose="05000000000000000000" pitchFamily="2" charset="2"/>
+              <a:buChar char="Ø"/>
             </a:pPr>
             <a:r>
               <a:rPr lang="en-US" altLang="zh-CN" dirty="0" smtClean="0">
@@ -3913,9 +3958,9 @@
             </a:r>
           </a:p>
           <a:p>
-            <a:pPr algn="l">
-              <a:buFont typeface="Arial" pitchFamily="34" charset="0"/>
-              <a:buChar char="•"/>
+            <a:pPr marL="457200" indent="-457200" algn="l">
+              <a:buFont typeface="Wingdings" panose="05000000000000000000" pitchFamily="2" charset="2"/>
+              <a:buChar char="Ø"/>
             </a:pPr>
             <a:r>
               <a:rPr lang="en-US" altLang="zh-CN" dirty="0" smtClean="0">
@@ -3929,9 +3974,9 @@
             </a:r>
           </a:p>
           <a:p>
-            <a:pPr algn="l">
-              <a:buFont typeface="Arial" pitchFamily="34" charset="0"/>
-              <a:buChar char="•"/>
+            <a:pPr marL="457200" indent="-457200" algn="l">
+              <a:buFont typeface="Wingdings" panose="05000000000000000000" pitchFamily="2" charset="2"/>
+              <a:buChar char="Ø"/>
             </a:pPr>
             <a:r>
               <a:rPr lang="en-US" altLang="zh-CN" dirty="0" smtClean="0">
@@ -3945,9 +3990,9 @@
             </a:r>
           </a:p>
           <a:p>
-            <a:pPr algn="l">
-              <a:buFont typeface="Arial" pitchFamily="34" charset="0"/>
-              <a:buChar char="•"/>
+            <a:pPr marL="457200" indent="-457200" algn="l">
+              <a:buFont typeface="Wingdings" panose="05000000000000000000" pitchFamily="2" charset="2"/>
+              <a:buChar char="Ø"/>
             </a:pPr>
             <a:r>
               <a:rPr lang="en-US" altLang="zh-CN" dirty="0" smtClean="0">
@@ -7410,7 +7455,6 @@
               <a:rPr lang="en-US" altLang="zh-CN" dirty="0" smtClean="0"/>
               <a:t>Model: Code first Approach</a:t>
             </a:r>
-            <a:endParaRPr lang="en-US" altLang="zh-CN" dirty="0" smtClean="0"/>
           </a:p>
           <a:p>
             <a:r>
@@ -7429,15 +7473,7 @@
           <a:p>
             <a:r>
               <a:rPr lang="en-US" altLang="zh-CN" dirty="0" smtClean="0"/>
-              <a:t>BLL: </a:t>
-            </a:r>
-            <a:r>
-              <a:rPr lang="en-US" altLang="zh-CN" dirty="0" smtClean="0"/>
-              <a:t>Domain Model </a:t>
-            </a:r>
-            <a:r>
-              <a:rPr lang="en-US" altLang="zh-CN" dirty="0" smtClean="0"/>
-              <a:t>pattern, Singleton</a:t>
+              <a:t>BLL: Domain Model pattern, Singleton</a:t>
             </a:r>
           </a:p>
           <a:p>
@@ -7450,7 +7486,15 @@
             <a:pPr lvl="1"/>
             <a:r>
               <a:rPr lang="en-US" altLang="zh-CN" dirty="0" smtClean="0"/>
-              <a:t>MVC for external user(individual user &amp; HR)</a:t>
+              <a:t>MVC for external </a:t>
+            </a:r>
+            <a:r>
+              <a:rPr lang="en-US" altLang="zh-CN" dirty="0" smtClean="0"/>
+              <a:t>user(Individual </a:t>
+            </a:r>
+            <a:r>
+              <a:rPr lang="en-US" altLang="zh-CN" dirty="0" smtClean="0"/>
+              <a:t>user &amp; HR)</a:t>
             </a:r>
           </a:p>
           <a:p>
@@ -7461,11 +7505,11 @@
             </a:r>
             <a:r>
               <a:rPr lang="en-US" altLang="zh-CN" dirty="0" smtClean="0"/>
-              <a:t> for internal user(</a:t>
-            </a:r>
-            <a:r>
-              <a:rPr lang="en-US" altLang="zh-CN" dirty="0" err="1" smtClean="0"/>
-              <a:t>admins</a:t>
+              <a:t> for internal </a:t>
+            </a:r>
+            <a:r>
+              <a:rPr lang="en-US" altLang="zh-CN" dirty="0" smtClean="0"/>
+              <a:t>user(Admins</a:t>
             </a:r>
             <a:r>
               <a:rPr lang="en-US" altLang="zh-CN" dirty="0" smtClean="0"/>
@@ -7544,11 +7588,7 @@
           <a:p>
             <a:r>
               <a:rPr lang="en-US" altLang="zh-CN" dirty="0" smtClean="0"/>
-              <a:t>Code </a:t>
-            </a:r>
-            <a:r>
-              <a:rPr lang="en-US" altLang="zh-CN" dirty="0" smtClean="0"/>
-              <a:t>walkthrough &amp; Demo</a:t>
+              <a:t>Code walkthrough &amp; Demo</a:t>
             </a:r>
             <a:endParaRPr lang="zh-CN" altLang="en-US" dirty="0"/>
           </a:p>
@@ -7581,7 +7621,6 @@
               <a:rPr lang="en-US" altLang="zh-CN" dirty="0" smtClean="0"/>
               <a:t>DAL</a:t>
             </a:r>
-            <a:endParaRPr lang="en-US" altLang="zh-CN" dirty="0" smtClean="0"/>
           </a:p>
           <a:p>
             <a:r>
@@ -7594,7 +7633,6 @@
               <a:rPr lang="en-US" altLang="zh-CN" dirty="0" smtClean="0"/>
               <a:t>PRL</a:t>
             </a:r>
-            <a:endParaRPr lang="en-US" altLang="zh-CN" dirty="0" smtClean="0"/>
           </a:p>
           <a:p>
             <a:pPr lvl="1"/>
@@ -7604,27 +7642,40 @@
             </a:r>
             <a:r>
               <a:rPr lang="en-US" altLang="zh-CN" dirty="0" smtClean="0"/>
-              <a:t> Course, Class management</a:t>
-            </a:r>
+              <a:t> </a:t>
+            </a:r>
+            <a:r>
+              <a:rPr lang="en-US" altLang="zh-CN" dirty="0" smtClean="0"/>
+              <a:t>(Course</a:t>
+            </a:r>
+            <a:r>
+              <a:rPr lang="en-US" altLang="zh-CN" dirty="0" smtClean="0"/>
+              <a:t>, Class </a:t>
+            </a:r>
+            <a:r>
+              <a:rPr lang="en-US" altLang="zh-CN" dirty="0" smtClean="0"/>
+              <a:t>management)</a:t>
+            </a:r>
+            <a:endParaRPr lang="en-US" altLang="zh-CN" dirty="0" smtClean="0"/>
           </a:p>
           <a:p>
             <a:pPr lvl="1"/>
             <a:r>
               <a:rPr lang="en-US" altLang="zh-CN" dirty="0" smtClean="0"/>
-              <a:t>MVC Course registration</a:t>
-            </a:r>
+              <a:t>MVC </a:t>
+            </a:r>
+            <a:r>
+              <a:rPr lang="en-US" altLang="zh-CN" dirty="0" smtClean="0"/>
+              <a:t>(Course registration)</a:t>
+            </a:r>
+            <a:endParaRPr lang="en-US" altLang="zh-CN" dirty="0" smtClean="0"/>
           </a:p>
           <a:p>
             <a:pPr lvl="1"/>
             <a:r>
               <a:rPr lang="en-US" altLang="zh-CN" dirty="0" smtClean="0"/>
-              <a:t>User Management, </a:t>
-            </a:r>
-            <a:r>
-              <a:rPr lang="en-US" altLang="zh-CN" dirty="0" smtClean="0"/>
-              <a:t>Security</a:t>
-            </a:r>
-            <a:endParaRPr lang="en-US" altLang="zh-CN" dirty="0" smtClean="0"/>
+              <a:t>User Management, Security</a:t>
+            </a:r>
           </a:p>
         </p:txBody>
       </p:sp>
@@ -7693,7 +7744,37 @@
           <a:p>
             <a:r>
               <a:rPr lang="en-US" altLang="zh-CN" dirty="0" smtClean="0"/>
-              <a:t>Course registration </a:t>
+              <a:t>Functionality code walkthrough</a:t>
+            </a:r>
+            <a:endParaRPr lang="en-US" altLang="zh-CN" dirty="0" smtClean="0"/>
+          </a:p>
+          <a:p>
+            <a:pPr lvl="1"/>
+            <a:r>
+              <a:rPr lang="en-US" altLang="zh-CN" dirty="0" smtClean="0"/>
+              <a:t>Course </a:t>
+            </a:r>
+            <a:r>
+              <a:rPr lang="en-US" altLang="zh-CN" dirty="0" smtClean="0"/>
+              <a:t>registration </a:t>
+            </a:r>
+          </a:p>
+          <a:p>
+            <a:pPr lvl="1"/>
+            <a:r>
+              <a:rPr lang="en-US" altLang="zh-CN" dirty="0" smtClean="0"/>
+              <a:t>Attendance system</a:t>
+            </a:r>
+          </a:p>
+          <a:p>
+            <a:pPr lvl="1"/>
+            <a:r>
+              <a:rPr lang="en-US" altLang="zh-CN" dirty="0" smtClean="0"/>
+              <a:t>Successful </a:t>
+            </a:r>
+            <a:r>
+              <a:rPr lang="en-US" altLang="zh-CN" dirty="0" smtClean="0"/>
+              <a:t>registration data</a:t>
             </a:r>
           </a:p>
           <a:p>
@@ -7702,37 +7783,7 @@
             </a:pPr>
             <a:r>
               <a:rPr lang="en-US" altLang="zh-CN" dirty="0" smtClean="0"/>
-              <a:t>		for enterprise customer</a:t>
-            </a:r>
-          </a:p>
-          <a:p>
-            <a:r>
-              <a:rPr lang="en-US" altLang="zh-CN" dirty="0" smtClean="0"/>
-              <a:t>Attendance system</a:t>
-            </a:r>
-          </a:p>
-          <a:p>
-            <a:pPr>
-              <a:buNone/>
-            </a:pPr>
-            <a:r>
-              <a:rPr lang="en-US" altLang="zh-CN" dirty="0" smtClean="0"/>
-              <a:t>		for instructor</a:t>
-            </a:r>
-          </a:p>
-          <a:p>
-            <a:r>
-              <a:rPr lang="en-US" altLang="zh-CN" dirty="0" smtClean="0"/>
-              <a:t>Successful registration data</a:t>
-            </a:r>
-          </a:p>
-          <a:p>
-            <a:pPr>
-              <a:buNone/>
-            </a:pPr>
-            <a:r>
-              <a:rPr lang="en-US" altLang="zh-CN" dirty="0" smtClean="0"/>
-              <a:t>		for financial department</a:t>
+              <a:t>	</a:t>
             </a:r>
           </a:p>
         </p:txBody>
@@ -7779,7 +7830,7 @@
           <a:p>
             <a:r>
               <a:rPr lang="en-US" altLang="zh-CN" dirty="0" smtClean="0"/>
-              <a:t>WWF</a:t>
+              <a:t>Service layer</a:t>
             </a:r>
             <a:endParaRPr lang="zh-CN" altLang="en-US" dirty="0"/>
           </a:p>
@@ -7802,7 +7853,7 @@
           <a:p>
             <a:r>
               <a:rPr lang="en-US" altLang="zh-CN" dirty="0" smtClean="0"/>
-              <a:t>Course confirm process</a:t>
+              <a:t>Binding &amp; Security</a:t>
             </a:r>
           </a:p>
           <a:p>
@@ -7810,9 +7861,18 @@
           </a:p>
           <a:p>
             <a:r>
+              <a:rPr lang="en-US" altLang="zh-CN" smtClean="0"/>
+              <a:t>Justification </a:t>
+            </a:r>
+            <a:r>
               <a:rPr lang="en-US" altLang="zh-CN" dirty="0" smtClean="0"/>
-              <a:t>Course completion process</a:t>
-            </a:r>
+              <a:t>&amp; demo</a:t>
+            </a:r>
+          </a:p>
+          <a:p>
+            <a:endParaRPr lang="en-US" altLang="zh-CN" dirty="0" smtClean="0"/>
+          </a:p>
+          <a:p>
             <a:endParaRPr lang="zh-CN" altLang="en-US" dirty="0"/>
           </a:p>
         </p:txBody>
@@ -7859,7 +7919,7 @@
           <a:p>
             <a:r>
               <a:rPr lang="en-US" altLang="zh-CN" dirty="0" smtClean="0"/>
-              <a:t>Service layer</a:t>
+              <a:t>WWF</a:t>
             </a:r>
             <a:endParaRPr lang="zh-CN" altLang="en-US" dirty="0"/>
           </a:p>
@@ -7882,7 +7942,7 @@
           <a:p>
             <a:r>
               <a:rPr lang="en-US" altLang="zh-CN" dirty="0" smtClean="0"/>
-              <a:t>Binding &amp; Security</a:t>
+              <a:t>Course confirm process</a:t>
             </a:r>
           </a:p>
           <a:p>
@@ -7890,18 +7950,9 @@
           </a:p>
           <a:p>
             <a:r>
-              <a:rPr lang="en-US" altLang="zh-CN" smtClean="0"/>
-              <a:t>Justification </a:t>
-            </a:r>
-            <a:r>
               <a:rPr lang="en-US" altLang="zh-CN" dirty="0" smtClean="0"/>
-              <a:t>&amp; demo</a:t>
-            </a:r>
-          </a:p>
-          <a:p>
-            <a:endParaRPr lang="en-US" altLang="zh-CN" dirty="0" smtClean="0"/>
-          </a:p>
-          <a:p>
+              <a:t>Course completion process</a:t>
+            </a:r>
             <a:endParaRPr lang="zh-CN" altLang="en-US" dirty="0"/>
           </a:p>
         </p:txBody>

</xml_diff>